<commit_message>
Update Graphics lecture (done except for Robot Face being in English
</commit_message>
<xml_diff>
--- a/docs/slides/Graphics.pptx
+++ b/docs/slides/Graphics.pptx
@@ -5408,7 +5408,7 @@
         </p:nvSpPr>
         <p:spPr>
           <a:xfrm>
-            <a:off x="150312" y="3181611"/>
+            <a:off x="75156" y="3899746"/>
             <a:ext cx="2592888" cy="523220"/>
           </a:xfrm>
           <a:prstGeom prst="rect">
@@ -5542,6 +5542,103 @@
           </a:p>
         </p:txBody>
       </p:sp>
+      <p:cxnSp>
+        <p:nvCxnSpPr>
+          <p:cNvPr id="11" name="Straight Arrow Connector 10">
+            <a:extLst>
+              <a:ext uri="{FF2B5EF4-FFF2-40B4-BE49-F238E27FC236}">
+                <a16:creationId xmlns:a16="http://schemas.microsoft.com/office/drawing/2014/main" id="{1134E374-0B71-7B44-A4BF-0E40F3915EF3}"/>
+              </a:ext>
+            </a:extLst>
+          </p:cNvPr>
+          <p:cNvCxnSpPr>
+            <a:cxnSpLocks/>
+          </p:cNvCxnSpPr>
+          <p:nvPr/>
+        </p:nvCxnSpPr>
+        <p:spPr>
+          <a:xfrm>
+            <a:off x="0" y="2362145"/>
+            <a:ext cx="2743200" cy="7337"/>
+          </a:xfrm>
+          <a:prstGeom prst="straightConnector1">
+            <a:avLst/>
+          </a:prstGeom>
+          <a:ln w="50800">
+            <a:solidFill>
+              <a:srgbClr val="00B050"/>
+            </a:solidFill>
+            <a:headEnd type="triangle"/>
+            <a:tailEnd type="triangle"/>
+          </a:ln>
+        </p:spPr>
+        <p:style>
+          <a:lnRef idx="2">
+            <a:schemeClr val="accent1"/>
+          </a:lnRef>
+          <a:fillRef idx="0">
+            <a:schemeClr val="accent1"/>
+          </a:fillRef>
+          <a:effectRef idx="1">
+            <a:schemeClr val="accent1"/>
+          </a:effectRef>
+          <a:fontRef idx="minor">
+            <a:schemeClr val="tx1"/>
+          </a:fontRef>
+        </p:style>
+      </p:cxnSp>
+      <p:sp>
+        <p:nvSpPr>
+          <p:cNvPr id="12" name="TextBox 11">
+            <a:extLst>
+              <a:ext uri="{FF2B5EF4-FFF2-40B4-BE49-F238E27FC236}">
+                <a16:creationId xmlns:a16="http://schemas.microsoft.com/office/drawing/2014/main" id="{0F04937F-F8AF-D747-BE66-E5529A9B5FD4}"/>
+              </a:ext>
+            </a:extLst>
+          </p:cNvPr>
+          <p:cNvSpPr txBox="1"/>
+          <p:nvPr/>
+        </p:nvSpPr>
+        <p:spPr>
+          <a:xfrm>
+            <a:off x="150312" y="2514109"/>
+            <a:ext cx="3169358" cy="1200329"/>
+          </a:xfrm>
+          <a:prstGeom prst="rect">
+            <a:avLst/>
+          </a:prstGeom>
+          <a:noFill/>
+        </p:spPr>
+        <p:txBody>
+          <a:bodyPr wrap="square" rtlCol="0">
+            <a:spAutoFit/>
+          </a:bodyPr>
+          <a:lstStyle/>
+          <a:p>
+            <a:r>
+              <a:rPr lang="en-US" sz="2400" dirty="0" err="1"/>
+              <a:t>darAncho</a:t>
+            </a:r>
+            <a:r>
+              <a:rPr lang="en-US" sz="2400" dirty="0"/>
+              <a:t>() / 2 –</a:t>
+            </a:r>
+          </a:p>
+          <a:p>
+            <a:r>
+              <a:rPr lang="en-US" sz="2400" dirty="0" err="1"/>
+              <a:t>rect.darAncho</a:t>
+            </a:r>
+            <a:r>
+              <a:rPr lang="en-US" sz="2400" dirty="0"/>
+              <a:t>() / 2</a:t>
+            </a:r>
+          </a:p>
+          <a:p>
+            <a:endParaRPr lang="en-US" sz="2400" dirty="0"/>
+          </a:p>
+        </p:txBody>
+      </p:sp>
     </p:spTree>
     <p:extLst>
       <p:ext uri="{BB962C8B-B14F-4D97-AF65-F5344CB8AC3E}">
@@ -5552,6 +5649,184 @@
   <p:clrMapOvr>
     <a:masterClrMapping/>
   </p:clrMapOvr>
+  <p:timing>
+    <p:tnLst>
+      <p:par>
+        <p:cTn id="1" dur="indefinite" restart="never" nodeType="tmRoot">
+          <p:childTnLst>
+            <p:seq concurrent="1" nextAc="seek">
+              <p:cTn id="2" dur="indefinite" nodeType="mainSeq">
+                <p:childTnLst>
+                  <p:par>
+                    <p:cTn id="3" fill="hold">
+                      <p:stCondLst>
+                        <p:cond delay="indefinite"/>
+                      </p:stCondLst>
+                      <p:childTnLst>
+                        <p:par>
+                          <p:cTn id="4" fill="hold">
+                            <p:stCondLst>
+                              <p:cond delay="0"/>
+                            </p:stCondLst>
+                            <p:childTnLst>
+                              <p:par>
+                                <p:cTn id="5" presetID="1" presetClass="entr" presetSubtype="0" fill="hold" grpId="0" nodeType="clickEffect">
+                                  <p:stCondLst>
+                                    <p:cond delay="0"/>
+                                  </p:stCondLst>
+                                  <p:childTnLst>
+                                    <p:set>
+                                      <p:cBhvr>
+                                        <p:cTn id="6" dur="1" fill="hold">
+                                          <p:stCondLst>
+                                            <p:cond delay="0"/>
+                                          </p:stCondLst>
+                                        </p:cTn>
+                                        <p:tgtEl>
+                                          <p:spTgt spid="9"/>
+                                        </p:tgtEl>
+                                        <p:attrNameLst>
+                                          <p:attrName>style.visibility</p:attrName>
+                                        </p:attrNameLst>
+                                      </p:cBhvr>
+                                      <p:to>
+                                        <p:strVal val="visible"/>
+                                      </p:to>
+                                    </p:set>
+                                  </p:childTnLst>
+                                </p:cTn>
+                              </p:par>
+                              <p:par>
+                                <p:cTn id="7" presetID="1" presetClass="entr" presetSubtype="0" fill="hold" nodeType="withEffect">
+                                  <p:stCondLst>
+                                    <p:cond delay="0"/>
+                                  </p:stCondLst>
+                                  <p:childTnLst>
+                                    <p:set>
+                                      <p:cBhvr>
+                                        <p:cTn id="8" dur="1" fill="hold">
+                                          <p:stCondLst>
+                                            <p:cond delay="0"/>
+                                          </p:stCondLst>
+                                        </p:cTn>
+                                        <p:tgtEl>
+                                          <p:spTgt spid="7"/>
+                                        </p:tgtEl>
+                                        <p:attrNameLst>
+                                          <p:attrName>style.visibility</p:attrName>
+                                        </p:attrNameLst>
+                                      </p:cBhvr>
+                                      <p:to>
+                                        <p:strVal val="visible"/>
+                                      </p:to>
+                                    </p:set>
+                                  </p:childTnLst>
+                                </p:cTn>
+                              </p:par>
+                            </p:childTnLst>
+                          </p:cTn>
+                        </p:par>
+                      </p:childTnLst>
+                    </p:cTn>
+                  </p:par>
+                  <p:par>
+                    <p:cTn id="9" fill="hold">
+                      <p:stCondLst>
+                        <p:cond delay="indefinite"/>
+                      </p:stCondLst>
+                      <p:childTnLst>
+                        <p:par>
+                          <p:cTn id="10" fill="hold">
+                            <p:stCondLst>
+                              <p:cond delay="0"/>
+                            </p:stCondLst>
+                            <p:childTnLst>
+                              <p:par>
+                                <p:cTn id="11" presetID="1" presetClass="entr" presetSubtype="0" fill="hold" nodeType="clickEffect">
+                                  <p:stCondLst>
+                                    <p:cond delay="0"/>
+                                  </p:stCondLst>
+                                  <p:childTnLst>
+                                    <p:set>
+                                      <p:cBhvr>
+                                        <p:cTn id="12" dur="1" fill="hold">
+                                          <p:stCondLst>
+                                            <p:cond delay="0"/>
+                                          </p:stCondLst>
+                                        </p:cTn>
+                                        <p:tgtEl>
+                                          <p:spTgt spid="11"/>
+                                        </p:tgtEl>
+                                        <p:attrNameLst>
+                                          <p:attrName>style.visibility</p:attrName>
+                                        </p:attrNameLst>
+                                      </p:cBhvr>
+                                      <p:to>
+                                        <p:strVal val="visible"/>
+                                      </p:to>
+                                    </p:set>
+                                  </p:childTnLst>
+                                </p:cTn>
+                              </p:par>
+                              <p:par>
+                                <p:cTn id="13" presetID="1" presetClass="entr" presetSubtype="0" fill="hold" grpId="0" nodeType="withEffect">
+                                  <p:stCondLst>
+                                    <p:cond delay="0"/>
+                                  </p:stCondLst>
+                                  <p:childTnLst>
+                                    <p:set>
+                                      <p:cBhvr>
+                                        <p:cTn id="14" dur="1" fill="hold">
+                                          <p:stCondLst>
+                                            <p:cond delay="0"/>
+                                          </p:stCondLst>
+                                        </p:cTn>
+                                        <p:tgtEl>
+                                          <p:spTgt spid="12"/>
+                                        </p:tgtEl>
+                                        <p:attrNameLst>
+                                          <p:attrName>style.visibility</p:attrName>
+                                        </p:attrNameLst>
+                                      </p:cBhvr>
+                                      <p:to>
+                                        <p:strVal val="visible"/>
+                                      </p:to>
+                                    </p:set>
+                                  </p:childTnLst>
+                                </p:cTn>
+                              </p:par>
+                            </p:childTnLst>
+                          </p:cTn>
+                        </p:par>
+                      </p:childTnLst>
+                    </p:cTn>
+                  </p:par>
+                </p:childTnLst>
+              </p:cTn>
+              <p:prevCondLst>
+                <p:cond evt="onPrev" delay="0">
+                  <p:tgtEl>
+                    <p:sldTgt/>
+                  </p:tgtEl>
+                </p:cond>
+              </p:prevCondLst>
+              <p:nextCondLst>
+                <p:cond evt="onNext" delay="0">
+                  <p:tgtEl>
+                    <p:sldTgt/>
+                  </p:tgtEl>
+                </p:cond>
+              </p:nextCondLst>
+            </p:seq>
+          </p:childTnLst>
+        </p:cTn>
+      </p:par>
+    </p:tnLst>
+    <p:bldLst>
+      <p:bldP spid="9" grpId="0"/>
+      <p:bldP spid="12" grpId="0"/>
+    </p:bldLst>
+  </p:timing>
 </p:sld>
 </file>
 
@@ -5962,6 +6237,103 @@
           </a:p>
         </p:txBody>
       </p:sp>
+      <p:cxnSp>
+        <p:nvCxnSpPr>
+          <p:cNvPr id="10" name="Straight Arrow Connector 9">
+            <a:extLst>
+              <a:ext uri="{FF2B5EF4-FFF2-40B4-BE49-F238E27FC236}">
+                <a16:creationId xmlns:a16="http://schemas.microsoft.com/office/drawing/2014/main" id="{C9E58E18-216B-1047-9159-89191C871654}"/>
+              </a:ext>
+            </a:extLst>
+          </p:cNvPr>
+          <p:cNvCxnSpPr>
+            <a:cxnSpLocks/>
+          </p:cNvCxnSpPr>
+          <p:nvPr/>
+        </p:nvCxnSpPr>
+        <p:spPr>
+          <a:xfrm>
+            <a:off x="3657600" y="824591"/>
+            <a:ext cx="0" cy="830614"/>
+          </a:xfrm>
+          <a:prstGeom prst="straightConnector1">
+            <a:avLst/>
+          </a:prstGeom>
+          <a:ln w="50800">
+            <a:solidFill>
+              <a:srgbClr val="00B050"/>
+            </a:solidFill>
+            <a:headEnd type="triangle"/>
+            <a:tailEnd type="triangle"/>
+          </a:ln>
+        </p:spPr>
+        <p:style>
+          <a:lnRef idx="2">
+            <a:schemeClr val="accent1"/>
+          </a:lnRef>
+          <a:fillRef idx="0">
+            <a:schemeClr val="accent1"/>
+          </a:fillRef>
+          <a:effectRef idx="1">
+            <a:schemeClr val="accent1"/>
+          </a:effectRef>
+          <a:fontRef idx="minor">
+            <a:schemeClr val="tx1"/>
+          </a:fontRef>
+        </p:style>
+      </p:cxnSp>
+      <p:sp>
+        <p:nvSpPr>
+          <p:cNvPr id="13" name="TextBox 12">
+            <a:extLst>
+              <a:ext uri="{FF2B5EF4-FFF2-40B4-BE49-F238E27FC236}">
+                <a16:creationId xmlns:a16="http://schemas.microsoft.com/office/drawing/2014/main" id="{8AC714C6-0B66-0B46-85E5-5EDF9C557AFC}"/>
+              </a:ext>
+            </a:extLst>
+          </p:cNvPr>
+          <p:cNvSpPr txBox="1"/>
+          <p:nvPr/>
+        </p:nvSpPr>
+        <p:spPr>
+          <a:xfrm>
+            <a:off x="1233677" y="722235"/>
+            <a:ext cx="3169358" cy="1200329"/>
+          </a:xfrm>
+          <a:prstGeom prst="rect">
+            <a:avLst/>
+          </a:prstGeom>
+          <a:noFill/>
+        </p:spPr>
+        <p:txBody>
+          <a:bodyPr wrap="square" rtlCol="0">
+            <a:spAutoFit/>
+          </a:bodyPr>
+          <a:lstStyle/>
+          <a:p>
+            <a:r>
+              <a:rPr lang="en-US" sz="2400" dirty="0" err="1"/>
+              <a:t>darAlto</a:t>
+            </a:r>
+            <a:r>
+              <a:rPr lang="en-US" sz="2400" dirty="0"/>
+              <a:t>() / 2 –</a:t>
+            </a:r>
+          </a:p>
+          <a:p>
+            <a:r>
+              <a:rPr lang="en-US" sz="2400" dirty="0" err="1"/>
+              <a:t>rect.darAlto</a:t>
+            </a:r>
+            <a:r>
+              <a:rPr lang="en-US" sz="2400" dirty="0"/>
+              <a:t>() / 2</a:t>
+            </a:r>
+          </a:p>
+          <a:p>
+            <a:endParaRPr lang="en-US" sz="2400" dirty="0"/>
+          </a:p>
+        </p:txBody>
+      </p:sp>
     </p:spTree>
     <p:extLst>
       <p:ext uri="{BB962C8B-B14F-4D97-AF65-F5344CB8AC3E}">
@@ -5972,6 +6344,184 @@
   <p:clrMapOvr>
     <a:masterClrMapping/>
   </p:clrMapOvr>
+  <p:timing>
+    <p:tnLst>
+      <p:par>
+        <p:cTn id="1" dur="indefinite" restart="never" nodeType="tmRoot">
+          <p:childTnLst>
+            <p:seq concurrent="1" nextAc="seek">
+              <p:cTn id="2" dur="indefinite" nodeType="mainSeq">
+                <p:childTnLst>
+                  <p:par>
+                    <p:cTn id="3" fill="hold">
+                      <p:stCondLst>
+                        <p:cond delay="indefinite"/>
+                      </p:stCondLst>
+                      <p:childTnLst>
+                        <p:par>
+                          <p:cTn id="4" fill="hold">
+                            <p:stCondLst>
+                              <p:cond delay="0"/>
+                            </p:stCondLst>
+                            <p:childTnLst>
+                              <p:par>
+                                <p:cTn id="5" presetID="1" presetClass="entr" presetSubtype="0" fill="hold" nodeType="clickEffect">
+                                  <p:stCondLst>
+                                    <p:cond delay="0"/>
+                                  </p:stCondLst>
+                                  <p:childTnLst>
+                                    <p:set>
+                                      <p:cBhvr>
+                                        <p:cTn id="6" dur="1" fill="hold">
+                                          <p:stCondLst>
+                                            <p:cond delay="0"/>
+                                          </p:stCondLst>
+                                        </p:cTn>
+                                        <p:tgtEl>
+                                          <p:spTgt spid="12"/>
+                                        </p:tgtEl>
+                                        <p:attrNameLst>
+                                          <p:attrName>style.visibility</p:attrName>
+                                        </p:attrNameLst>
+                                      </p:cBhvr>
+                                      <p:to>
+                                        <p:strVal val="visible"/>
+                                      </p:to>
+                                    </p:set>
+                                  </p:childTnLst>
+                                </p:cTn>
+                              </p:par>
+                              <p:par>
+                                <p:cTn id="7" presetID="1" presetClass="entr" presetSubtype="0" fill="hold" grpId="0" nodeType="withEffect">
+                                  <p:stCondLst>
+                                    <p:cond delay="0"/>
+                                  </p:stCondLst>
+                                  <p:childTnLst>
+                                    <p:set>
+                                      <p:cBhvr>
+                                        <p:cTn id="8" dur="1" fill="hold">
+                                          <p:stCondLst>
+                                            <p:cond delay="0"/>
+                                          </p:stCondLst>
+                                        </p:cTn>
+                                        <p:tgtEl>
+                                          <p:spTgt spid="9"/>
+                                        </p:tgtEl>
+                                        <p:attrNameLst>
+                                          <p:attrName>style.visibility</p:attrName>
+                                        </p:attrNameLst>
+                                      </p:cBhvr>
+                                      <p:to>
+                                        <p:strVal val="visible"/>
+                                      </p:to>
+                                    </p:set>
+                                  </p:childTnLst>
+                                </p:cTn>
+                              </p:par>
+                            </p:childTnLst>
+                          </p:cTn>
+                        </p:par>
+                      </p:childTnLst>
+                    </p:cTn>
+                  </p:par>
+                  <p:par>
+                    <p:cTn id="9" fill="hold">
+                      <p:stCondLst>
+                        <p:cond delay="indefinite"/>
+                      </p:stCondLst>
+                      <p:childTnLst>
+                        <p:par>
+                          <p:cTn id="10" fill="hold">
+                            <p:stCondLst>
+                              <p:cond delay="0"/>
+                            </p:stCondLst>
+                            <p:childTnLst>
+                              <p:par>
+                                <p:cTn id="11" presetID="1" presetClass="entr" presetSubtype="0" fill="hold" nodeType="clickEffect">
+                                  <p:stCondLst>
+                                    <p:cond delay="0"/>
+                                  </p:stCondLst>
+                                  <p:childTnLst>
+                                    <p:set>
+                                      <p:cBhvr>
+                                        <p:cTn id="12" dur="1" fill="hold">
+                                          <p:stCondLst>
+                                            <p:cond delay="0"/>
+                                          </p:stCondLst>
+                                        </p:cTn>
+                                        <p:tgtEl>
+                                          <p:spTgt spid="10"/>
+                                        </p:tgtEl>
+                                        <p:attrNameLst>
+                                          <p:attrName>style.visibility</p:attrName>
+                                        </p:attrNameLst>
+                                      </p:cBhvr>
+                                      <p:to>
+                                        <p:strVal val="visible"/>
+                                      </p:to>
+                                    </p:set>
+                                  </p:childTnLst>
+                                </p:cTn>
+                              </p:par>
+                              <p:par>
+                                <p:cTn id="13" presetID="1" presetClass="entr" presetSubtype="0" fill="hold" grpId="0" nodeType="withEffect">
+                                  <p:stCondLst>
+                                    <p:cond delay="0"/>
+                                  </p:stCondLst>
+                                  <p:childTnLst>
+                                    <p:set>
+                                      <p:cBhvr>
+                                        <p:cTn id="14" dur="1" fill="hold">
+                                          <p:stCondLst>
+                                            <p:cond delay="0"/>
+                                          </p:stCondLst>
+                                        </p:cTn>
+                                        <p:tgtEl>
+                                          <p:spTgt spid="13"/>
+                                        </p:tgtEl>
+                                        <p:attrNameLst>
+                                          <p:attrName>style.visibility</p:attrName>
+                                        </p:attrNameLst>
+                                      </p:cBhvr>
+                                      <p:to>
+                                        <p:strVal val="visible"/>
+                                      </p:to>
+                                    </p:set>
+                                  </p:childTnLst>
+                                </p:cTn>
+                              </p:par>
+                            </p:childTnLst>
+                          </p:cTn>
+                        </p:par>
+                      </p:childTnLst>
+                    </p:cTn>
+                  </p:par>
+                </p:childTnLst>
+              </p:cTn>
+              <p:prevCondLst>
+                <p:cond evt="onPrev" delay="0">
+                  <p:tgtEl>
+                    <p:sldTgt/>
+                  </p:tgtEl>
+                </p:cond>
+              </p:prevCondLst>
+              <p:nextCondLst>
+                <p:cond evt="onNext" delay="0">
+                  <p:tgtEl>
+                    <p:sldTgt/>
+                  </p:tgtEl>
+                </p:cond>
+              </p:nextCondLst>
+            </p:seq>
+          </p:childTnLst>
+        </p:cTn>
+      </p:par>
+    </p:tnLst>
+    <p:bldLst>
+      <p:bldP spid="9" grpId="0"/>
+      <p:bldP spid="13" grpId="0"/>
+    </p:bldLst>
+  </p:timing>
 </p:sld>
 </file>
 
@@ -6623,13 +7173,8 @@
             </a:r>
             <a:r>
               <a:rPr lang="en-US" sz="2400" dirty="0"/>
-              <a:t> </a:t>
-            </a:r>
-            <a:r>
-              <a:rPr lang="en-US" sz="2400"/>
-              <a:t>al canvas</a:t>
-            </a:r>
-            <a:endParaRPr lang="en-US" sz="2400" dirty="0"/>
+              <a:t> al canvas</a:t>
+            </a:r>
           </a:p>
         </p:txBody>
       </p:sp>
@@ -7090,18 +7635,25 @@
               <a:t>	</a:t>
             </a:r>
             <a:r>
-              <a:rPr lang="en-US" dirty="0" err="1">
+              <a:rPr lang="en-US" err="1">
                 <a:latin typeface="Courier"/>
                 <a:cs typeface="Courier"/>
               </a:rPr>
-              <a:t>etiqueta.setFont</a:t>
+              <a:t>etiqueta</a:t>
+            </a:r>
+            <a:r>
+              <a:rPr lang="en-US">
+                <a:latin typeface="Courier"/>
+                <a:cs typeface="Courier"/>
+              </a:rPr>
+              <a:t>.cambiarFuente(“</a:t>
             </a:r>
             <a:r>
               <a:rPr lang="en-US" dirty="0">
                 <a:latin typeface="Courier"/>
                 <a:cs typeface="Courier"/>
               </a:rPr>
-              <a:t>(“SansSerif-36”);</a:t>
+              <a:t>SansSerif-36”);</a:t>
             </a:r>
           </a:p>
           <a:p>
@@ -8197,7 +8749,7 @@
                 <a:latin typeface="Courier"/>
                 <a:cs typeface="Courier"/>
               </a:rPr>
-              <a:t>etiqueta.setFont</a:t>
+              <a:t>etiqueta.cambiarFuente</a:t>
             </a:r>
             <a:r>
               <a:rPr lang="en-US" dirty="0">

</xml_diff>

<commit_message>
Finalize graphics slides and update robotFace code
</commit_message>
<xml_diff>
--- a/docs/slides/Graphics.pptx
+++ b/docs/slides/Graphics.pptx
@@ -18,8 +18,8 @@
     <p:sldId id="350" r:id="rId9"/>
     <p:sldId id="267" r:id="rId10"/>
     <p:sldId id="333" r:id="rId11"/>
-    <p:sldId id="345" r:id="rId12"/>
-    <p:sldId id="346" r:id="rId13"/>
+    <p:sldId id="352" r:id="rId12"/>
+    <p:sldId id="353" r:id="rId13"/>
     <p:sldId id="334" r:id="rId14"/>
     <p:sldId id="349" r:id="rId15"/>
     <p:sldId id="338" r:id="rId16"/>
@@ -515,6 +515,329 @@
       </p:grpSpPr>
       <p:sp>
         <p:nvSpPr>
+          <p:cNvPr id="2" name="Slide Image Placeholder 1"/>
+          <p:cNvSpPr>
+            <a:spLocks noGrp="1" noRot="1" noChangeAspect="1"/>
+          </p:cNvSpPr>
+          <p:nvPr>
+            <p:ph type="sldImg"/>
+          </p:nvPr>
+        </p:nvSpPr>
+        <p:spPr/>
+      </p:sp>
+      <p:sp>
+        <p:nvSpPr>
+          <p:cNvPr id="3" name="Notes Placeholder 2"/>
+          <p:cNvSpPr>
+            <a:spLocks noGrp="1"/>
+          </p:cNvSpPr>
+          <p:nvPr>
+            <p:ph type="body" idx="1"/>
+          </p:nvPr>
+        </p:nvSpPr>
+        <p:spPr/>
+        <p:txBody>
+          <a:bodyPr/>
+          <a:lstStyle/>
+          <a:p>
+            <a:r>
+              <a:rPr lang="es-ES_tradnl" dirty="0" err="1"/>
+              <a:t>Welcome</a:t>
+            </a:r>
+            <a:r>
+              <a:rPr lang="es-ES_tradnl" dirty="0"/>
+              <a:t> back, </a:t>
+            </a:r>
+            <a:r>
+              <a:rPr lang="es-ES_tradnl" dirty="0" err="1"/>
+              <a:t>first</a:t>
+            </a:r>
+            <a:r>
+              <a:rPr lang="es-ES_tradnl" dirty="0"/>
+              <a:t> I </a:t>
+            </a:r>
+            <a:r>
+              <a:rPr lang="es-ES_tradnl" dirty="0" err="1"/>
+              <a:t>want</a:t>
+            </a:r>
+            <a:r>
+              <a:rPr lang="es-ES_tradnl" dirty="0"/>
+              <a:t> to </a:t>
+            </a:r>
+            <a:r>
+              <a:rPr lang="es-ES_tradnl" dirty="0" err="1"/>
+              <a:t>say</a:t>
+            </a:r>
+            <a:r>
+              <a:rPr lang="es-ES_tradnl" dirty="0"/>
+              <a:t> </a:t>
+            </a:r>
+            <a:r>
+              <a:rPr lang="es-ES_tradnl" dirty="0" err="1"/>
+              <a:t>that</a:t>
+            </a:r>
+            <a:r>
+              <a:rPr lang="es-ES_tradnl" dirty="0"/>
+              <a:t> </a:t>
+            </a:r>
+            <a:r>
+              <a:rPr lang="es-ES_tradnl" dirty="0" err="1"/>
+              <a:t>the</a:t>
+            </a:r>
+            <a:r>
+              <a:rPr lang="es-ES_tradnl" dirty="0"/>
+              <a:t> </a:t>
+            </a:r>
+            <a:r>
+              <a:rPr lang="es-ES_tradnl" dirty="0" err="1"/>
+              <a:t>purpose</a:t>
+            </a:r>
+            <a:r>
+              <a:rPr lang="es-ES_tradnl" dirty="0"/>
+              <a:t> of </a:t>
+            </a:r>
+            <a:r>
+              <a:rPr lang="es-ES_tradnl" dirty="0" err="1"/>
+              <a:t>these</a:t>
+            </a:r>
+            <a:r>
+              <a:rPr lang="es-ES_tradnl" dirty="0"/>
+              <a:t> </a:t>
+            </a:r>
+            <a:r>
+              <a:rPr lang="es-ES_tradnl" dirty="0" err="1"/>
+              <a:t>lectures</a:t>
+            </a:r>
+            <a:r>
+              <a:rPr lang="es-ES_tradnl" dirty="0"/>
+              <a:t> </a:t>
+            </a:r>
+            <a:r>
+              <a:rPr lang="es-ES_tradnl" dirty="0" err="1"/>
+              <a:t>is</a:t>
+            </a:r>
+            <a:r>
+              <a:rPr lang="es-ES_tradnl" dirty="0"/>
+              <a:t> </a:t>
+            </a:r>
+            <a:r>
+              <a:rPr lang="es-ES_tradnl" dirty="0" err="1"/>
+              <a:t>just</a:t>
+            </a:r>
+            <a:r>
+              <a:rPr lang="es-ES_tradnl" dirty="0"/>
+              <a:t> to introduce </a:t>
+            </a:r>
+            <a:r>
+              <a:rPr lang="es-ES_tradnl" dirty="0" err="1"/>
+              <a:t>you</a:t>
+            </a:r>
+            <a:r>
+              <a:rPr lang="es-ES_tradnl" dirty="0"/>
+              <a:t> to </a:t>
+            </a:r>
+            <a:r>
+              <a:rPr lang="es-ES_tradnl" dirty="0" err="1"/>
+              <a:t>these</a:t>
+            </a:r>
+            <a:r>
+              <a:rPr lang="es-ES_tradnl" dirty="0"/>
+              <a:t> ideas; </a:t>
+            </a:r>
+            <a:r>
+              <a:rPr lang="es-ES_tradnl" dirty="0" err="1"/>
+              <a:t>we</a:t>
+            </a:r>
+            <a:r>
+              <a:rPr lang="es-ES_tradnl" dirty="0"/>
+              <a:t> </a:t>
+            </a:r>
+            <a:r>
+              <a:rPr lang="es-ES_tradnl" dirty="0" err="1"/>
+              <a:t>expect</a:t>
+            </a:r>
+            <a:r>
+              <a:rPr lang="es-ES_tradnl" dirty="0"/>
+              <a:t> </a:t>
+            </a:r>
+            <a:r>
+              <a:rPr lang="es-ES_tradnl" dirty="0" err="1"/>
+              <a:t>you</a:t>
+            </a:r>
+            <a:r>
+              <a:rPr lang="es-ES_tradnl" dirty="0"/>
+              <a:t> to </a:t>
+            </a:r>
+            <a:r>
+              <a:rPr lang="es-ES_tradnl" dirty="0" err="1"/>
+              <a:t>actually</a:t>
+            </a:r>
+            <a:r>
+              <a:rPr lang="es-ES_tradnl" dirty="0"/>
+              <a:t> </a:t>
+            </a:r>
+            <a:r>
+              <a:rPr lang="es-ES_tradnl" dirty="0" err="1"/>
+              <a:t>learn</a:t>
+            </a:r>
+            <a:r>
+              <a:rPr lang="es-ES_tradnl" dirty="0"/>
+              <a:t> in </a:t>
+            </a:r>
+            <a:r>
+              <a:rPr lang="es-ES_tradnl" dirty="0" err="1"/>
+              <a:t>section</a:t>
+            </a:r>
+            <a:r>
+              <a:rPr lang="es-ES_tradnl" dirty="0"/>
+              <a:t>. </a:t>
+            </a:r>
+            <a:r>
+              <a:rPr lang="es-ES_tradnl" dirty="0" err="1"/>
+              <a:t>Next</a:t>
+            </a:r>
+            <a:r>
+              <a:rPr lang="es-ES_tradnl" dirty="0"/>
+              <a:t> </a:t>
+            </a:r>
+            <a:r>
+              <a:rPr lang="es-ES_tradnl" dirty="0" err="1"/>
+              <a:t>we</a:t>
+            </a:r>
+            <a:r>
+              <a:rPr lang="es-ES_tradnl" dirty="0"/>
+              <a:t> </a:t>
+            </a:r>
+            <a:r>
+              <a:rPr lang="es-ES_tradnl" dirty="0" err="1"/>
+              <a:t>want</a:t>
+            </a:r>
+            <a:r>
+              <a:rPr lang="es-ES_tradnl" dirty="0"/>
+              <a:t> to </a:t>
+            </a:r>
+            <a:r>
+              <a:rPr lang="es-ES_tradnl" dirty="0" err="1"/>
+              <a:t>clarify</a:t>
+            </a:r>
+            <a:r>
+              <a:rPr lang="es-ES_tradnl" dirty="0"/>
+              <a:t> a </a:t>
+            </a:r>
+            <a:r>
+              <a:rPr lang="es-ES_tradnl" dirty="0" err="1"/>
+              <a:t>few</a:t>
+            </a:r>
+            <a:r>
+              <a:rPr lang="es-ES_tradnl" dirty="0"/>
+              <a:t> </a:t>
+            </a:r>
+            <a:r>
+              <a:rPr lang="es-ES_tradnl" dirty="0" err="1"/>
+              <a:t>things</a:t>
+            </a:r>
+            <a:r>
+              <a:rPr lang="es-ES_tradnl" dirty="0"/>
+              <a:t> </a:t>
+            </a:r>
+            <a:r>
+              <a:rPr lang="es-ES_tradnl" dirty="0" err="1"/>
+              <a:t>we’ve</a:t>
+            </a:r>
+            <a:r>
+              <a:rPr lang="es-ES_tradnl" dirty="0"/>
+              <a:t> </a:t>
+            </a:r>
+            <a:r>
+              <a:rPr lang="es-ES_tradnl" dirty="0" err="1"/>
+              <a:t>been</a:t>
+            </a:r>
+            <a:r>
+              <a:rPr lang="es-ES_tradnl" dirty="0"/>
+              <a:t> </a:t>
+            </a:r>
+            <a:r>
+              <a:rPr lang="es-ES_tradnl" dirty="0" err="1"/>
+              <a:t>seeing</a:t>
+            </a:r>
+            <a:r>
+              <a:rPr lang="es-ES_tradnl" dirty="0"/>
+              <a:t> </a:t>
+            </a:r>
+            <a:r>
+              <a:rPr lang="es-ES_tradnl" dirty="0" err="1"/>
+              <a:t>pretty</a:t>
+            </a:r>
+            <a:r>
+              <a:rPr lang="es-ES_tradnl" dirty="0"/>
+              <a:t> </a:t>
+            </a:r>
+            <a:r>
+              <a:rPr lang="es-ES_tradnl" dirty="0" err="1"/>
+              <a:t>commonly</a:t>
+            </a:r>
+            <a:r>
+              <a:rPr lang="es-ES_tradnl" dirty="0"/>
+              <a:t>…</a:t>
+            </a:r>
+          </a:p>
+        </p:txBody>
+      </p:sp>
+      <p:sp>
+        <p:nvSpPr>
+          <p:cNvPr id="4" name="Slide Number Placeholder 3"/>
+          <p:cNvSpPr>
+            <a:spLocks noGrp="1"/>
+          </p:cNvSpPr>
+          <p:nvPr>
+            <p:ph type="sldNum" sz="quarter" idx="5"/>
+          </p:nvPr>
+        </p:nvSpPr>
+        <p:spPr/>
+        <p:txBody>
+          <a:bodyPr/>
+          <a:lstStyle/>
+          <a:p>
+            <a:fld id="{A9ACA772-D1E0-4E46-AD01-20D67ABA9F22}" type="slidenum">
+              <a:rPr lang="en-US" smtClean="0"/>
+              <a:t>1</a:t>
+            </a:fld>
+            <a:endParaRPr lang="en-US"/>
+          </a:p>
+        </p:txBody>
+      </p:sp>
+    </p:spTree>
+    <p:extLst>
+      <p:ext uri="{BB962C8B-B14F-4D97-AF65-F5344CB8AC3E}">
+        <p14:creationId xmlns:p14="http://schemas.microsoft.com/office/powerpoint/2010/main" val="1384987733"/>
+      </p:ext>
+    </p:extLst>
+  </p:cSld>
+  <p:clrMapOvr>
+    <a:masterClrMapping/>
+  </p:clrMapOvr>
+</p:notes>
+</file>
+
+<file path=ppt/notesSlides/notesSlide2.xml><?xml version="1.0" encoding="utf-8"?>
+<p:notes xmlns:a="http://schemas.openxmlformats.org/drawingml/2006/main" xmlns:r="http://schemas.openxmlformats.org/officeDocument/2006/relationships" xmlns:p="http://schemas.openxmlformats.org/presentationml/2006/main">
+  <p:cSld>
+    <p:spTree>
+      <p:nvGrpSpPr>
+        <p:cNvPr id="1" name=""/>
+        <p:cNvGrpSpPr/>
+        <p:nvPr/>
+      </p:nvGrpSpPr>
+      <p:grpSpPr>
+        <a:xfrm>
+          <a:off x="0" y="0"/>
+          <a:ext cx="0" cy="0"/>
+          <a:chOff x="0" y="0"/>
+          <a:chExt cx="0" cy="0"/>
+        </a:xfrm>
+      </p:grpSpPr>
+      <p:sp>
+        <p:nvSpPr>
           <p:cNvPr id="7" name="Rectangle 7"/>
           <p:cNvSpPr>
             <a:spLocks noGrp="1" noChangeArrowheads="1"/>
@@ -631,7 +954,7 @@
 </p:notes>
 </file>
 
-<file path=ppt/notesSlides/notesSlide2.xml><?xml version="1.0" encoding="utf-8"?>
+<file path=ppt/notesSlides/notesSlide3.xml><?xml version="1.0" encoding="utf-8"?>
 <p:notes xmlns:a="http://schemas.openxmlformats.org/drawingml/2006/main" xmlns:r="http://schemas.openxmlformats.org/officeDocument/2006/relationships" xmlns:p="http://schemas.openxmlformats.org/presentationml/2006/main">
   <p:cSld>
     <p:spTree>
@@ -766,7 +1089,7 @@
 </p:notes>
 </file>
 
-<file path=ppt/notesSlides/notesSlide3.xml><?xml version="1.0" encoding="utf-8"?>
+<file path=ppt/notesSlides/notesSlide4.xml><?xml version="1.0" encoding="utf-8"?>
 <p:notes xmlns:a="http://schemas.openxmlformats.org/drawingml/2006/main" xmlns:r="http://schemas.openxmlformats.org/officeDocument/2006/relationships" xmlns:p="http://schemas.openxmlformats.org/presentationml/2006/main">
   <p:cSld>
     <p:spTree>
@@ -901,7 +1224,7 @@
 </p:notes>
 </file>
 
-<file path=ppt/notesSlides/notesSlide4.xml><?xml version="1.0" encoding="utf-8"?>
+<file path=ppt/notesSlides/notesSlide5.xml><?xml version="1.0" encoding="utf-8"?>
 <p:notes xmlns:a="http://schemas.openxmlformats.org/drawingml/2006/main" xmlns:r="http://schemas.openxmlformats.org/officeDocument/2006/relationships" xmlns:p="http://schemas.openxmlformats.org/presentationml/2006/main">
   <p:cSld>
     <p:spTree>
@@ -1036,7 +1359,7 @@
 </p:notes>
 </file>
 
-<file path=ppt/notesSlides/notesSlide5.xml><?xml version="1.0" encoding="utf-8"?>
+<file path=ppt/notesSlides/notesSlide6.xml><?xml version="1.0" encoding="utf-8"?>
 <p:notes xmlns:a="http://schemas.openxmlformats.org/drawingml/2006/main" xmlns:r="http://schemas.openxmlformats.org/officeDocument/2006/relationships" xmlns:p="http://schemas.openxmlformats.org/presentationml/2006/main">
   <p:cSld>
     <p:spTree>
@@ -1171,7 +1494,7 @@
 </p:notes>
 </file>
 
-<file path=ppt/notesSlides/notesSlide6.xml><?xml version="1.0" encoding="utf-8"?>
+<file path=ppt/notesSlides/notesSlide7.xml><?xml version="1.0" encoding="utf-8"?>
 <p:notes xmlns:a="http://schemas.openxmlformats.org/drawingml/2006/main" xmlns:r="http://schemas.openxmlformats.org/officeDocument/2006/relationships" xmlns:p="http://schemas.openxmlformats.org/presentationml/2006/main">
   <p:cSld>
     <p:spTree>
@@ -1306,7 +1629,7 @@
 </p:notes>
 </file>
 
-<file path=ppt/notesSlides/notesSlide7.xml><?xml version="1.0" encoding="utf-8"?>
+<file path=ppt/notesSlides/notesSlide8.xml><?xml version="1.0" encoding="utf-8"?>
 <p:notes xmlns:a="http://schemas.openxmlformats.org/drawingml/2006/main" xmlns:r="http://schemas.openxmlformats.org/officeDocument/2006/relationships" xmlns:p="http://schemas.openxmlformats.org/presentationml/2006/main">
   <p:cSld>
     <p:spTree>
@@ -1441,7 +1764,7 @@
 </p:notes>
 </file>
 
-<file path=ppt/notesSlides/notesSlide8.xml><?xml version="1.0" encoding="utf-8"?>
+<file path=ppt/notesSlides/notesSlide9.xml><?xml version="1.0" encoding="utf-8"?>
 <p:notes xmlns:a="http://schemas.openxmlformats.org/drawingml/2006/main" xmlns:r="http://schemas.openxmlformats.org/officeDocument/2006/relationships" xmlns:p="http://schemas.openxmlformats.org/presentationml/2006/main">
   <p:cSld>
     <p:spTree>
@@ -4552,7 +4875,7 @@
           <p:nvPr/>
         </p:nvPicPr>
         <p:blipFill>
-          <a:blip r:embed="rId2">
+          <a:blip r:embed="rId3">
             <a:extLst>
               <a:ext uri="{28A0092B-C50C-407E-A947-70E740481C1C}">
                 <a14:useLocalDpi xmlns:a14="http://schemas.microsoft.com/office/drawing/2010/main" val="0"/>
@@ -4774,7 +5097,7 @@
           <p:nvPr/>
         </p:nvPicPr>
         <p:blipFill>
-          <a:blip r:embed="rId3">
+          <a:blip r:embed="rId4">
             <a:extLst>
               <a:ext uri="{28A0092B-C50C-407E-A947-70E740481C1C}">
                 <a14:useLocalDpi xmlns:a14="http://schemas.microsoft.com/office/drawing/2010/main" val="0"/>
@@ -4821,7 +5144,7 @@
           <p:nvPr/>
         </p:nvPicPr>
         <p:blipFill>
-          <a:blip r:embed="rId4"/>
+          <a:blip r:embed="rId5"/>
           <a:stretch>
             <a:fillRect/>
           </a:stretch>
@@ -5052,28 +5375,28 @@
       </p:sp>
       <p:pic>
         <p:nvPicPr>
-          <p:cNvPr id="4" name="Picture 3"/>
+          <p:cNvPr id="3" name="Picture 2">
+            <a:extLst>
+              <a:ext uri="{FF2B5EF4-FFF2-40B4-BE49-F238E27FC236}">
+                <a16:creationId xmlns:a16="http://schemas.microsoft.com/office/drawing/2014/main" id="{C9C7A3C9-6ACC-8E42-AE7B-BEFC5DAE45A8}"/>
+              </a:ext>
+            </a:extLst>
+          </p:cNvPr>
           <p:cNvPicPr>
             <a:picLocks noChangeAspect="1"/>
           </p:cNvPicPr>
           <p:nvPr/>
         </p:nvPicPr>
         <p:blipFill>
-          <a:blip r:embed="rId2">
-            <a:extLst>
-              <a:ext uri="{28A0092B-C50C-407E-A947-70E740481C1C}">
-                <a14:useLocalDpi xmlns:a14="http://schemas.microsoft.com/office/drawing/2010/main" val="0"/>
-              </a:ext>
-            </a:extLst>
-          </a:blip>
+          <a:blip r:embed="rId2"/>
           <a:stretch>
             <a:fillRect/>
           </a:stretch>
         </p:blipFill>
         <p:spPr>
           <a:xfrm>
-            <a:off x="0" y="797391"/>
-            <a:ext cx="9144000" cy="5966642"/>
+            <a:off x="0" y="722235"/>
+            <a:ext cx="9144000" cy="5940447"/>
           </a:xfrm>
           <a:prstGeom prst="rect">
             <a:avLst/>
@@ -5088,7 +5411,7 @@
         </p:nvSpPr>
         <p:spPr>
           <a:xfrm>
-            <a:off x="2561572" y="1487797"/>
+            <a:off x="2442302" y="1243153"/>
             <a:ext cx="513568" cy="450937"/>
           </a:xfrm>
           <a:prstGeom prst="donut">
@@ -5338,44 +5661,94 @@
       </p:sp>
       <p:pic>
         <p:nvPicPr>
-          <p:cNvPr id="4" name="Picture 3"/>
+          <p:cNvPr id="3" name="Picture 2">
+            <a:extLst>
+              <a:ext uri="{FF2B5EF4-FFF2-40B4-BE49-F238E27FC236}">
+                <a16:creationId xmlns:a16="http://schemas.microsoft.com/office/drawing/2014/main" id="{C9C7A3C9-6ACC-8E42-AE7B-BEFC5DAE45A8}"/>
+              </a:ext>
+            </a:extLst>
+          </p:cNvPr>
           <p:cNvPicPr>
             <a:picLocks noChangeAspect="1"/>
           </p:cNvPicPr>
           <p:nvPr/>
         </p:nvPicPr>
         <p:blipFill>
-          <a:blip r:embed="rId2">
-            <a:extLst>
-              <a:ext uri="{28A0092B-C50C-407E-A947-70E740481C1C}">
-                <a14:useLocalDpi xmlns:a14="http://schemas.microsoft.com/office/drawing/2010/main" val="0"/>
-              </a:ext>
-            </a:extLst>
-          </a:blip>
+          <a:blip r:embed="rId2"/>
           <a:stretch>
             <a:fillRect/>
           </a:stretch>
         </p:blipFill>
         <p:spPr>
           <a:xfrm>
-            <a:off x="0" y="797391"/>
-            <a:ext cx="9144000" cy="5966642"/>
+            <a:off x="0" y="722235"/>
+            <a:ext cx="9144000" cy="5940447"/>
           </a:xfrm>
           <a:prstGeom prst="rect">
             <a:avLst/>
           </a:prstGeom>
         </p:spPr>
       </p:pic>
+      <p:sp>
+        <p:nvSpPr>
+          <p:cNvPr id="6" name="Donut 5"/>
+          <p:cNvSpPr/>
+          <p:nvPr/>
+        </p:nvSpPr>
+        <p:spPr>
+          <a:xfrm>
+            <a:off x="2442302" y="1243153"/>
+            <a:ext cx="513568" cy="450937"/>
+          </a:xfrm>
+          <a:prstGeom prst="donut">
+            <a:avLst/>
+          </a:prstGeom>
+        </p:spPr>
+        <p:style>
+          <a:lnRef idx="1">
+            <a:schemeClr val="accent1"/>
+          </a:lnRef>
+          <a:fillRef idx="3">
+            <a:schemeClr val="accent1"/>
+          </a:fillRef>
+          <a:effectRef idx="2">
+            <a:schemeClr val="accent1"/>
+          </a:effectRef>
+          <a:fontRef idx="minor">
+            <a:schemeClr val="lt1"/>
+          </a:fontRef>
+        </p:style>
+        <p:txBody>
+          <a:bodyPr rtlCol="0" anchor="ctr"/>
+          <a:lstStyle/>
+          <a:p>
+            <a:pPr algn="ctr"/>
+            <a:endParaRPr lang="en-US">
+              <a:solidFill>
+                <a:schemeClr val="tx1"/>
+              </a:solidFill>
+            </a:endParaRPr>
+          </a:p>
+        </p:txBody>
+      </p:sp>
       <p:cxnSp>
         <p:nvCxnSpPr>
-          <p:cNvPr id="3" name="Straight Arrow Connector 2"/>
-          <p:cNvCxnSpPr/>
+          <p:cNvPr id="7" name="Straight Arrow Connector 6">
+            <a:extLst>
+              <a:ext uri="{FF2B5EF4-FFF2-40B4-BE49-F238E27FC236}">
+                <a16:creationId xmlns:a16="http://schemas.microsoft.com/office/drawing/2014/main" id="{ED4CAD61-1FBE-2F46-94C5-C27EF845FC21}"/>
+              </a:ext>
+            </a:extLst>
+          </p:cNvPr>
+          <p:cNvCxnSpPr>
+            <a:cxnSpLocks/>
+          </p:cNvCxnSpPr>
           <p:nvPr/>
         </p:nvCxnSpPr>
         <p:spPr>
-          <a:xfrm>
-            <a:off x="0" y="3730608"/>
-            <a:ext cx="4609578" cy="14674"/>
+          <a:xfrm flipV="1">
+            <a:off x="0" y="3819777"/>
+            <a:ext cx="4572000" cy="13576"/>
           </a:xfrm>
           <a:prstGeom prst="straightConnector1">
             <a:avLst/>
@@ -5402,7 +5775,13 @@
       </p:cxnSp>
       <p:sp>
         <p:nvSpPr>
-          <p:cNvPr id="6" name="TextBox 5"/>
+          <p:cNvPr id="8" name="TextBox 7">
+            <a:extLst>
+              <a:ext uri="{FF2B5EF4-FFF2-40B4-BE49-F238E27FC236}">
+                <a16:creationId xmlns:a16="http://schemas.microsoft.com/office/drawing/2014/main" id="{21124D90-C9CB-8940-9335-3218CC6F0172}"/>
+              </a:ext>
+            </a:extLst>
+          </p:cNvPr>
           <p:cNvSpPr txBox="1"/>
           <p:nvPr/>
         </p:nvSpPr>
@@ -5435,13 +5814,19 @@
       </p:sp>
       <p:cxnSp>
         <p:nvCxnSpPr>
-          <p:cNvPr id="7" name="Straight Arrow Connector 6"/>
+          <p:cNvPr id="9" name="Straight Arrow Connector 8">
+            <a:extLst>
+              <a:ext uri="{FF2B5EF4-FFF2-40B4-BE49-F238E27FC236}">
+                <a16:creationId xmlns:a16="http://schemas.microsoft.com/office/drawing/2014/main" id="{F89D7A0B-178F-0145-90AB-77C50236F172}"/>
+              </a:ext>
+            </a:extLst>
+          </p:cNvPr>
           <p:cNvCxnSpPr/>
           <p:nvPr/>
         </p:nvCxnSpPr>
         <p:spPr>
           <a:xfrm>
-            <a:off x="2743200" y="1707666"/>
+            <a:off x="2611404" y="1134157"/>
             <a:ext cx="1866378" cy="14674"/>
           </a:xfrm>
           <a:prstGeom prst="straightConnector1">
@@ -5469,13 +5854,19 @@
       </p:cxnSp>
       <p:sp>
         <p:nvSpPr>
-          <p:cNvPr id="9" name="TextBox 8"/>
+          <p:cNvPr id="10" name="TextBox 9">
+            <a:extLst>
+              <a:ext uri="{FF2B5EF4-FFF2-40B4-BE49-F238E27FC236}">
+                <a16:creationId xmlns:a16="http://schemas.microsoft.com/office/drawing/2014/main" id="{3DF55B4B-EDE2-694C-806E-B2C32DDA0572}"/>
+              </a:ext>
+            </a:extLst>
+          </p:cNvPr>
           <p:cNvSpPr txBox="1"/>
           <p:nvPr/>
         </p:nvSpPr>
         <p:spPr>
           <a:xfrm>
-            <a:off x="1565753" y="1034134"/>
+            <a:off x="1433957" y="642701"/>
             <a:ext cx="3043825" cy="523220"/>
           </a:xfrm>
           <a:prstGeom prst="rect">
@@ -5500,54 +5891,12 @@
           </a:p>
         </p:txBody>
       </p:sp>
-      <p:sp>
-        <p:nvSpPr>
-          <p:cNvPr id="10" name="Donut 9"/>
-          <p:cNvSpPr/>
-          <p:nvPr/>
-        </p:nvSpPr>
-        <p:spPr>
-          <a:xfrm>
-            <a:off x="2561572" y="1487797"/>
-            <a:ext cx="513568" cy="450937"/>
-          </a:xfrm>
-          <a:prstGeom prst="donut">
-            <a:avLst/>
-          </a:prstGeom>
-        </p:spPr>
-        <p:style>
-          <a:lnRef idx="1">
-            <a:schemeClr val="accent1"/>
-          </a:lnRef>
-          <a:fillRef idx="3">
-            <a:schemeClr val="accent1"/>
-          </a:fillRef>
-          <a:effectRef idx="2">
-            <a:schemeClr val="accent1"/>
-          </a:effectRef>
-          <a:fontRef idx="minor">
-            <a:schemeClr val="lt1"/>
-          </a:fontRef>
-        </p:style>
-        <p:txBody>
-          <a:bodyPr rtlCol="0" anchor="ctr"/>
-          <a:lstStyle/>
-          <a:p>
-            <a:pPr algn="ctr"/>
-            <a:endParaRPr lang="en-US">
-              <a:solidFill>
-                <a:schemeClr val="tx1"/>
-              </a:solidFill>
-            </a:endParaRPr>
-          </a:p>
-        </p:txBody>
-      </p:sp>
       <p:cxnSp>
         <p:nvCxnSpPr>
-          <p:cNvPr id="11" name="Straight Arrow Connector 10">
+          <p:cNvPr id="12" name="Straight Arrow Connector 11">
             <a:extLst>
               <a:ext uri="{FF2B5EF4-FFF2-40B4-BE49-F238E27FC236}">
-                <a16:creationId xmlns:a16="http://schemas.microsoft.com/office/drawing/2014/main" id="{1134E374-0B71-7B44-A4BF-0E40F3915EF3}"/>
+                <a16:creationId xmlns:a16="http://schemas.microsoft.com/office/drawing/2014/main" id="{76E39857-ED17-DB40-9E78-3DF7B3056AA8}"/>
               </a:ext>
             </a:extLst>
           </p:cNvPr>
@@ -5558,8 +5907,8 @@
         </p:nvCxnSpPr>
         <p:spPr>
           <a:xfrm>
-            <a:off x="0" y="2362145"/>
-            <a:ext cx="2743200" cy="7337"/>
+            <a:off x="0" y="2369482"/>
+            <a:ext cx="2743200" cy="0"/>
           </a:xfrm>
           <a:prstGeom prst="straightConnector1">
             <a:avLst/>
@@ -5589,10 +5938,10 @@
       </p:cxnSp>
       <p:sp>
         <p:nvSpPr>
-          <p:cNvPr id="12" name="TextBox 11">
+          <p:cNvPr id="13" name="TextBox 12">
             <a:extLst>
               <a:ext uri="{FF2B5EF4-FFF2-40B4-BE49-F238E27FC236}">
-                <a16:creationId xmlns:a16="http://schemas.microsoft.com/office/drawing/2014/main" id="{0F04937F-F8AF-D747-BE66-E5529A9B5FD4}"/>
+                <a16:creationId xmlns:a16="http://schemas.microsoft.com/office/drawing/2014/main" id="{2E2B8EC2-E21C-0B4F-AB66-A5E07F9F3C0C}"/>
               </a:ext>
             </a:extLst>
           </p:cNvPr>
@@ -5601,7 +5950,7 @@
         </p:nvSpPr>
         <p:spPr>
           <a:xfrm>
-            <a:off x="150312" y="2514109"/>
+            <a:off x="75156" y="2435876"/>
             <a:ext cx="3169358" cy="1200329"/>
           </a:xfrm>
           <a:prstGeom prst="rect">
@@ -5642,7 +5991,7 @@
     </p:spTree>
     <p:extLst>
       <p:ext uri="{BB962C8B-B14F-4D97-AF65-F5344CB8AC3E}">
-        <p14:creationId xmlns:p14="http://schemas.microsoft.com/office/powerpoint/2010/main" val="919581596"/>
+        <p14:creationId xmlns:p14="http://schemas.microsoft.com/office/powerpoint/2010/main" val="905315521"/>
       </p:ext>
     </p:extLst>
   </p:cSld>
@@ -5683,7 +6032,7 @@
                                           </p:stCondLst>
                                         </p:cTn>
                                         <p:tgtEl>
-                                          <p:spTgt spid="9"/>
+                                          <p:spTgt spid="10"/>
                                         </p:tgtEl>
                                         <p:attrNameLst>
                                           <p:attrName>style.visibility</p:attrName>
@@ -5710,7 +6059,7 @@
                                           </p:stCondLst>
                                         </p:cTn>
                                         <p:tgtEl>
-                                          <p:spTgt spid="7"/>
+                                          <p:spTgt spid="9"/>
                                         </p:tgtEl>
                                         <p:attrNameLst>
                                           <p:attrName>style.visibility</p:attrName>
@@ -5755,7 +6104,7 @@
                                           </p:stCondLst>
                                         </p:cTn>
                                         <p:tgtEl>
-                                          <p:spTgt spid="11"/>
+                                          <p:spTgt spid="12"/>
                                         </p:tgtEl>
                                         <p:attrNameLst>
                                           <p:attrName>style.visibility</p:attrName>
@@ -5782,7 +6131,7 @@
                                           </p:stCondLst>
                                         </p:cTn>
                                         <p:tgtEl>
-                                          <p:spTgt spid="12"/>
+                                          <p:spTgt spid="13"/>
                                         </p:tgtEl>
                                         <p:attrNameLst>
                                           <p:attrName>style.visibility</p:attrName>
@@ -5823,8 +6172,8 @@
       </p:par>
     </p:tnLst>
     <p:bldLst>
-      <p:bldP spid="9" grpId="0"/>
-      <p:bldP spid="12" grpId="0"/>
+      <p:bldP spid="10" grpId="0"/>
+      <p:bldP spid="13" grpId="0"/>
     </p:bldLst>
   </p:timing>
 </p:sld>
@@ -6033,28 +6382,28 @@
       </p:sp>
       <p:pic>
         <p:nvPicPr>
-          <p:cNvPr id="4" name="Picture 3"/>
+          <p:cNvPr id="3" name="Picture 2">
+            <a:extLst>
+              <a:ext uri="{FF2B5EF4-FFF2-40B4-BE49-F238E27FC236}">
+                <a16:creationId xmlns:a16="http://schemas.microsoft.com/office/drawing/2014/main" id="{C9C7A3C9-6ACC-8E42-AE7B-BEFC5DAE45A8}"/>
+              </a:ext>
+            </a:extLst>
+          </p:cNvPr>
           <p:cNvPicPr>
             <a:picLocks noChangeAspect="1"/>
           </p:cNvPicPr>
           <p:nvPr/>
         </p:nvPicPr>
         <p:blipFill>
-          <a:blip r:embed="rId2">
-            <a:extLst>
-              <a:ext uri="{28A0092B-C50C-407E-A947-70E740481C1C}">
-                <a14:useLocalDpi xmlns:a14="http://schemas.microsoft.com/office/drawing/2010/main" val="0"/>
-              </a:ext>
-            </a:extLst>
-          </a:blip>
+          <a:blip r:embed="rId2"/>
           <a:stretch>
             <a:fillRect/>
           </a:stretch>
         </p:blipFill>
         <p:spPr>
           <a:xfrm>
-            <a:off x="0" y="797391"/>
-            <a:ext cx="9144000" cy="5966642"/>
+            <a:off x="0" y="722235"/>
+            <a:ext cx="9144000" cy="5940447"/>
           </a:xfrm>
           <a:prstGeom prst="rect">
             <a:avLst/>
@@ -6063,13 +6412,61 @@
       </p:pic>
       <p:sp>
         <p:nvSpPr>
-          <p:cNvPr id="6" name="TextBox 5"/>
+          <p:cNvPr id="6" name="Donut 5"/>
+          <p:cNvSpPr/>
+          <p:nvPr/>
+        </p:nvSpPr>
+        <p:spPr>
+          <a:xfrm>
+            <a:off x="2442302" y="1243153"/>
+            <a:ext cx="513568" cy="450937"/>
+          </a:xfrm>
+          <a:prstGeom prst="donut">
+            <a:avLst/>
+          </a:prstGeom>
+        </p:spPr>
+        <p:style>
+          <a:lnRef idx="1">
+            <a:schemeClr val="accent1"/>
+          </a:lnRef>
+          <a:fillRef idx="3">
+            <a:schemeClr val="accent1"/>
+          </a:fillRef>
+          <a:effectRef idx="2">
+            <a:schemeClr val="accent1"/>
+          </a:effectRef>
+          <a:fontRef idx="minor">
+            <a:schemeClr val="lt1"/>
+          </a:fontRef>
+        </p:style>
+        <p:txBody>
+          <a:bodyPr rtlCol="0" anchor="ctr"/>
+          <a:lstStyle/>
+          <a:p>
+            <a:pPr algn="ctr"/>
+            <a:endParaRPr lang="en-US">
+              <a:solidFill>
+                <a:schemeClr val="tx1"/>
+              </a:solidFill>
+            </a:endParaRPr>
+          </a:p>
+        </p:txBody>
+      </p:sp>
+      <p:sp>
+        <p:nvSpPr>
+          <p:cNvPr id="7" name="TextBox 6">
+            <a:extLst>
+              <a:ext uri="{FF2B5EF4-FFF2-40B4-BE49-F238E27FC236}">
+                <a16:creationId xmlns:a16="http://schemas.microsoft.com/office/drawing/2014/main" id="{6B342742-F4C6-1C43-A0CD-4307CFADDB0D}"/>
+              </a:ext>
+            </a:extLst>
+          </p:cNvPr>
           <p:cNvSpPr txBox="1"/>
           <p:nvPr/>
         </p:nvSpPr>
         <p:spPr>
           <a:xfrm>
-            <a:off x="4659683" y="4509370"/>
+            <a:off x="5166850" y="2318929"/>
             <a:ext cx="2592888" cy="523220"/>
           </a:xfrm>
           <a:prstGeom prst="rect">
@@ -6096,13 +6493,19 @@
       </p:sp>
       <p:sp>
         <p:nvSpPr>
-          <p:cNvPr id="9" name="TextBox 8"/>
+          <p:cNvPr id="8" name="TextBox 7">
+            <a:extLst>
+              <a:ext uri="{FF2B5EF4-FFF2-40B4-BE49-F238E27FC236}">
+                <a16:creationId xmlns:a16="http://schemas.microsoft.com/office/drawing/2014/main" id="{DC948BA3-30F6-B14E-A12D-3861FE2ED275}"/>
+              </a:ext>
+            </a:extLst>
+          </p:cNvPr>
           <p:cNvSpPr txBox="1"/>
           <p:nvPr/>
         </p:nvSpPr>
         <p:spPr>
           <a:xfrm>
-            <a:off x="1" y="2136425"/>
+            <a:off x="162703" y="2244684"/>
             <a:ext cx="3144032" cy="492443"/>
           </a:xfrm>
           <a:prstGeom prst="rect">
@@ -6129,13 +6532,19 @@
       </p:sp>
       <p:cxnSp>
         <p:nvCxnSpPr>
-          <p:cNvPr id="11" name="Straight Arrow Connector 10"/>
+          <p:cNvPr id="9" name="Straight Arrow Connector 8">
+            <a:extLst>
+              <a:ext uri="{FF2B5EF4-FFF2-40B4-BE49-F238E27FC236}">
+                <a16:creationId xmlns:a16="http://schemas.microsoft.com/office/drawing/2014/main" id="{74023679-5D2A-6C42-A01B-6A3A4664A31D}"/>
+              </a:ext>
+            </a:extLst>
+          </p:cNvPr>
           <p:cNvCxnSpPr/>
           <p:nvPr/>
         </p:nvCxnSpPr>
         <p:spPr>
           <a:xfrm>
-            <a:off x="4659683" y="824591"/>
+            <a:off x="4898222" y="709137"/>
             <a:ext cx="0" cy="2983321"/>
           </a:xfrm>
           <a:prstGeom prst="straightConnector1">
@@ -6163,14 +6572,22 @@
       </p:cxnSp>
       <p:cxnSp>
         <p:nvCxnSpPr>
-          <p:cNvPr id="12" name="Straight Arrow Connector 11"/>
-          <p:cNvCxnSpPr/>
+          <p:cNvPr id="10" name="Straight Arrow Connector 9">
+            <a:extLst>
+              <a:ext uri="{FF2B5EF4-FFF2-40B4-BE49-F238E27FC236}">
+                <a16:creationId xmlns:a16="http://schemas.microsoft.com/office/drawing/2014/main" id="{E8969144-3B5E-9F4D-84EC-4AFA467B98C8}"/>
+              </a:ext>
+            </a:extLst>
+          </p:cNvPr>
+          <p:cNvCxnSpPr>
+            <a:cxnSpLocks/>
+          </p:cNvCxnSpPr>
           <p:nvPr/>
         </p:nvCxnSpPr>
         <p:spPr>
           <a:xfrm>
-            <a:off x="2818356" y="1653436"/>
-            <a:ext cx="1" cy="2154476"/>
+            <a:off x="3156559" y="1468621"/>
+            <a:ext cx="0" cy="2223837"/>
           </a:xfrm>
           <a:prstGeom prst="straightConnector1">
             <a:avLst/>
@@ -6195,54 +6612,12 @@
           </a:fontRef>
         </p:style>
       </p:cxnSp>
-      <p:sp>
-        <p:nvSpPr>
-          <p:cNvPr id="15" name="Donut 14"/>
-          <p:cNvSpPr/>
-          <p:nvPr/>
-        </p:nvSpPr>
-        <p:spPr>
-          <a:xfrm>
-            <a:off x="2561572" y="1487797"/>
-            <a:ext cx="513568" cy="450937"/>
-          </a:xfrm>
-          <a:prstGeom prst="donut">
-            <a:avLst/>
-          </a:prstGeom>
-        </p:spPr>
-        <p:style>
-          <a:lnRef idx="1">
-            <a:schemeClr val="accent1"/>
-          </a:lnRef>
-          <a:fillRef idx="3">
-            <a:schemeClr val="accent1"/>
-          </a:fillRef>
-          <a:effectRef idx="2">
-            <a:schemeClr val="accent1"/>
-          </a:effectRef>
-          <a:fontRef idx="minor">
-            <a:schemeClr val="lt1"/>
-          </a:fontRef>
-        </p:style>
-        <p:txBody>
-          <a:bodyPr rtlCol="0" anchor="ctr"/>
-          <a:lstStyle/>
-          <a:p>
-            <a:pPr algn="ctr"/>
-            <a:endParaRPr lang="en-US">
-              <a:solidFill>
-                <a:schemeClr val="tx1"/>
-              </a:solidFill>
-            </a:endParaRPr>
-          </a:p>
-        </p:txBody>
-      </p:sp>
       <p:cxnSp>
         <p:nvCxnSpPr>
-          <p:cNvPr id="10" name="Straight Arrow Connector 9">
+          <p:cNvPr id="12" name="Straight Arrow Connector 11">
             <a:extLst>
               <a:ext uri="{FF2B5EF4-FFF2-40B4-BE49-F238E27FC236}">
-                <a16:creationId xmlns:a16="http://schemas.microsoft.com/office/drawing/2014/main" id="{C9E58E18-216B-1047-9159-89191C871654}"/>
+                <a16:creationId xmlns:a16="http://schemas.microsoft.com/office/drawing/2014/main" id="{5E47BFB8-3E2E-104C-8179-B3DA14236907}"/>
               </a:ext>
             </a:extLst>
           </p:cNvPr>
@@ -6253,8 +6628,8 @@
         </p:nvCxnSpPr>
         <p:spPr>
           <a:xfrm>
-            <a:off x="3657600" y="824591"/>
-            <a:ext cx="0" cy="830614"/>
+            <a:off x="3657600" y="722235"/>
+            <a:ext cx="0" cy="746386"/>
           </a:xfrm>
           <a:prstGeom prst="straightConnector1">
             <a:avLst/>
@@ -6287,7 +6662,7 @@
           <p:cNvPr id="13" name="TextBox 12">
             <a:extLst>
               <a:ext uri="{FF2B5EF4-FFF2-40B4-BE49-F238E27FC236}">
-                <a16:creationId xmlns:a16="http://schemas.microsoft.com/office/drawing/2014/main" id="{8AC714C6-0B66-0B46-85E5-5EDF9C557AFC}"/>
+                <a16:creationId xmlns:a16="http://schemas.microsoft.com/office/drawing/2014/main" id="{E72EF29B-83FA-A540-9F82-506BB1640E80}"/>
               </a:ext>
             </a:extLst>
           </p:cNvPr>
@@ -6296,8 +6671,8 @@
         </p:nvSpPr>
         <p:spPr>
           <a:xfrm>
-            <a:off x="1233677" y="722235"/>
-            <a:ext cx="3169358" cy="1200329"/>
+            <a:off x="162719" y="722235"/>
+            <a:ext cx="3144016" cy="1200329"/>
           </a:xfrm>
           <a:prstGeom prst="rect">
             <a:avLst/>
@@ -6337,7 +6712,7 @@
     </p:spTree>
     <p:extLst>
       <p:ext uri="{BB962C8B-B14F-4D97-AF65-F5344CB8AC3E}">
-        <p14:creationId xmlns:p14="http://schemas.microsoft.com/office/powerpoint/2010/main" val="708375362"/>
+        <p14:creationId xmlns:p14="http://schemas.microsoft.com/office/powerpoint/2010/main" val="1655380229"/>
       </p:ext>
     </p:extLst>
   </p:cSld>
@@ -6378,7 +6753,7 @@
                                           </p:stCondLst>
                                         </p:cTn>
                                         <p:tgtEl>
-                                          <p:spTgt spid="12"/>
+                                          <p:spTgt spid="10"/>
                                         </p:tgtEl>
                                         <p:attrNameLst>
                                           <p:attrName>style.visibility</p:attrName>
@@ -6405,7 +6780,7 @@
                                           </p:stCondLst>
                                         </p:cTn>
                                         <p:tgtEl>
-                                          <p:spTgt spid="9"/>
+                                          <p:spTgt spid="8"/>
                                         </p:tgtEl>
                                         <p:attrNameLst>
                                           <p:attrName>style.visibility</p:attrName>
@@ -6450,7 +6825,7 @@
                                           </p:stCondLst>
                                         </p:cTn>
                                         <p:tgtEl>
-                                          <p:spTgt spid="10"/>
+                                          <p:spTgt spid="12"/>
                                         </p:tgtEl>
                                         <p:attrNameLst>
                                           <p:attrName>style.visibility</p:attrName>
@@ -6518,7 +6893,7 @@
       </p:par>
     </p:tnLst>
     <p:bldLst>
-      <p:bldP spid="9" grpId="0"/>
+      <p:bldP spid="8" grpId="0"/>
       <p:bldP spid="13" grpId="0"/>
     </p:bldLst>
   </p:timing>
@@ -6715,28 +7090,28 @@
       </p:sp>
       <p:pic>
         <p:nvPicPr>
-          <p:cNvPr id="7" name="Picture 6"/>
+          <p:cNvPr id="3" name="Picture 2">
+            <a:extLst>
+              <a:ext uri="{FF2B5EF4-FFF2-40B4-BE49-F238E27FC236}">
+                <a16:creationId xmlns:a16="http://schemas.microsoft.com/office/drawing/2014/main" id="{166BF9C2-7210-5B4F-B211-EC30B48985B1}"/>
+              </a:ext>
+            </a:extLst>
+          </p:cNvPr>
           <p:cNvPicPr>
             <a:picLocks noChangeAspect="1"/>
           </p:cNvPicPr>
           <p:nvPr/>
         </p:nvPicPr>
         <p:blipFill>
-          <a:blip r:embed="rId2">
-            <a:extLst>
-              <a:ext uri="{28A0092B-C50C-407E-A947-70E740481C1C}">
-                <a14:useLocalDpi xmlns:a14="http://schemas.microsoft.com/office/drawing/2010/main" val="0"/>
-              </a:ext>
-            </a:extLst>
-          </a:blip>
+          <a:blip r:embed="rId2"/>
           <a:stretch>
             <a:fillRect/>
           </a:stretch>
         </p:blipFill>
         <p:spPr>
           <a:xfrm>
-            <a:off x="647700" y="3327648"/>
-            <a:ext cx="7848600" cy="749300"/>
+            <a:off x="0" y="3139021"/>
+            <a:ext cx="9144000" cy="579958"/>
           </a:xfrm>
           <a:prstGeom prst="rect">
             <a:avLst/>
@@ -6951,28 +7326,28 @@
       </p:sp>
       <p:pic>
         <p:nvPicPr>
-          <p:cNvPr id="2" name="Picture 1"/>
+          <p:cNvPr id="4" name="Picture 3">
+            <a:extLst>
+              <a:ext uri="{FF2B5EF4-FFF2-40B4-BE49-F238E27FC236}">
+                <a16:creationId xmlns:a16="http://schemas.microsoft.com/office/drawing/2014/main" id="{7198E350-E5ED-A149-84D3-566C839DC58B}"/>
+              </a:ext>
+            </a:extLst>
+          </p:cNvPr>
           <p:cNvPicPr>
             <a:picLocks noChangeAspect="1"/>
           </p:cNvPicPr>
           <p:nvPr/>
         </p:nvPicPr>
         <p:blipFill>
-          <a:blip r:embed="rId2">
-            <a:extLst>
-              <a:ext uri="{28A0092B-C50C-407E-A947-70E740481C1C}">
-                <a14:useLocalDpi xmlns:a14="http://schemas.microsoft.com/office/drawing/2010/main" val="0"/>
-              </a:ext>
-            </a:extLst>
-          </a:blip>
+          <a:blip r:embed="rId2"/>
           <a:stretch>
             <a:fillRect/>
           </a:stretch>
         </p:blipFill>
         <p:spPr>
           <a:xfrm>
-            <a:off x="0" y="797391"/>
-            <a:ext cx="9144000" cy="5962422"/>
+            <a:off x="0" y="945715"/>
+            <a:ext cx="9144000" cy="5912285"/>
           </a:xfrm>
           <a:prstGeom prst="rect">
             <a:avLst/>
@@ -6982,13 +7357,15 @@
       <p:cxnSp>
         <p:nvCxnSpPr>
           <p:cNvPr id="6" name="Straight Arrow Connector 5"/>
-          <p:cNvCxnSpPr/>
+          <p:cNvCxnSpPr>
+            <a:cxnSpLocks/>
+          </p:cNvCxnSpPr>
           <p:nvPr/>
         </p:nvCxnSpPr>
         <p:spPr>
           <a:xfrm>
-            <a:off x="3795386" y="1665962"/>
-            <a:ext cx="0" cy="2417523"/>
+            <a:off x="3934533" y="1749287"/>
+            <a:ext cx="0" cy="2453467"/>
           </a:xfrm>
           <a:prstGeom prst="straightConnector1">
             <a:avLst/>
@@ -7015,28 +7392,28 @@
       </p:cxnSp>
       <p:pic>
         <p:nvPicPr>
-          <p:cNvPr id="7" name="Picture 6"/>
+          <p:cNvPr id="9" name="Picture 8">
+            <a:extLst>
+              <a:ext uri="{FF2B5EF4-FFF2-40B4-BE49-F238E27FC236}">
+                <a16:creationId xmlns:a16="http://schemas.microsoft.com/office/drawing/2014/main" id="{DBEC6B3A-99F3-8245-BFD5-2AAE19BC281B}"/>
+              </a:ext>
+            </a:extLst>
+          </p:cNvPr>
           <p:cNvPicPr>
             <a:picLocks noChangeAspect="1"/>
           </p:cNvPicPr>
           <p:nvPr/>
         </p:nvPicPr>
         <p:blipFill>
-          <a:blip r:embed="rId3">
-            <a:extLst>
-              <a:ext uri="{28A0092B-C50C-407E-A947-70E740481C1C}">
-                <a14:useLocalDpi xmlns:a14="http://schemas.microsoft.com/office/drawing/2010/main" val="0"/>
-              </a:ext>
-            </a:extLst>
-          </a:blip>
+          <a:blip r:embed="rId3"/>
           <a:stretch>
             <a:fillRect/>
           </a:stretch>
         </p:blipFill>
         <p:spPr>
           <a:xfrm>
-            <a:off x="647700" y="797391"/>
-            <a:ext cx="7848600" cy="749300"/>
+            <a:off x="0" y="915898"/>
+            <a:ext cx="9144000" cy="579958"/>
           </a:xfrm>
           <a:prstGeom prst="rect">
             <a:avLst/>
@@ -7635,25 +8012,18 @@
               <a:t>	</a:t>
             </a:r>
             <a:r>
-              <a:rPr lang="en-US" err="1">
+              <a:rPr lang="en-US" dirty="0" err="1">
                 <a:latin typeface="Courier"/>
                 <a:cs typeface="Courier"/>
               </a:rPr>
-              <a:t>etiqueta</a:t>
-            </a:r>
-            <a:r>
-              <a:rPr lang="en-US">
-                <a:latin typeface="Courier"/>
-                <a:cs typeface="Courier"/>
-              </a:rPr>
-              <a:t>.cambiarFuente(“</a:t>
+              <a:t>etiqueta.cambiarFuente</a:t>
             </a:r>
             <a:r>
               <a:rPr lang="en-US" dirty="0">
                 <a:latin typeface="Courier"/>
                 <a:cs typeface="Courier"/>
               </a:rPr>
-              <a:t>SansSerif-36”);</a:t>
+              <a:t>(“SansSerif-36”);</a:t>
             </a:r>
           </a:p>
           <a:p>
@@ -9598,58 +9968,28 @@
       </p:sp>
       <p:pic>
         <p:nvPicPr>
-          <p:cNvPr id="3" name="Picture 2"/>
+          <p:cNvPr id="8" name="Picture 7">
+            <a:extLst>
+              <a:ext uri="{FF2B5EF4-FFF2-40B4-BE49-F238E27FC236}">
+                <a16:creationId xmlns:a16="http://schemas.microsoft.com/office/drawing/2014/main" id="{D1882E02-0AC9-204C-AE55-75FBABED2AF6}"/>
+              </a:ext>
+            </a:extLst>
+          </p:cNvPr>
           <p:cNvPicPr>
             <a:picLocks noChangeAspect="1"/>
           </p:cNvPicPr>
           <p:nvPr/>
         </p:nvPicPr>
         <p:blipFill>
-          <a:blip r:embed="rId2">
-            <a:extLst>
-              <a:ext uri="{28A0092B-C50C-407E-A947-70E740481C1C}">
-                <a14:useLocalDpi xmlns:a14="http://schemas.microsoft.com/office/drawing/2010/main" val="0"/>
-              </a:ext>
-            </a:extLst>
-          </a:blip>
+          <a:blip r:embed="rId2"/>
           <a:stretch>
             <a:fillRect/>
           </a:stretch>
         </p:blipFill>
         <p:spPr>
           <a:xfrm>
-            <a:off x="0" y="797391"/>
-            <a:ext cx="9144000" cy="5970850"/>
-          </a:xfrm>
-          <a:prstGeom prst="rect">
-            <a:avLst/>
-          </a:prstGeom>
-        </p:spPr>
-      </p:pic>
-      <p:pic>
-        <p:nvPicPr>
-          <p:cNvPr id="4" name="Picture 3"/>
-          <p:cNvPicPr>
-            <a:picLocks noChangeAspect="1"/>
-          </p:cNvPicPr>
-          <p:nvPr/>
-        </p:nvPicPr>
-        <p:blipFill>
-          <a:blip r:embed="rId3">
-            <a:extLst>
-              <a:ext uri="{28A0092B-C50C-407E-A947-70E740481C1C}">
-                <a14:useLocalDpi xmlns:a14="http://schemas.microsoft.com/office/drawing/2010/main" val="0"/>
-              </a:ext>
-            </a:extLst>
-          </a:blip>
-          <a:stretch>
-            <a:fillRect/>
-          </a:stretch>
-        </p:blipFill>
-        <p:spPr>
-          <a:xfrm>
-            <a:off x="450850" y="5967086"/>
-            <a:ext cx="8242300" cy="685800"/>
+            <a:off x="0" y="722235"/>
+            <a:ext cx="9144000" cy="5952805"/>
           </a:xfrm>
           <a:prstGeom prst="rect">
             <a:avLst/>
@@ -9664,7 +10004,7 @@
         </p:nvCxnSpPr>
         <p:spPr>
           <a:xfrm>
-            <a:off x="3312862" y="797391"/>
+            <a:off x="4923001" y="722235"/>
             <a:ext cx="0" cy="630576"/>
           </a:xfrm>
           <a:prstGeom prst="straightConnector1">
@@ -9690,6 +10030,36 @@
           </a:fontRef>
         </p:style>
       </p:cxnSp>
+      <p:pic>
+        <p:nvPicPr>
+          <p:cNvPr id="10" name="Picture 9">
+            <a:extLst>
+              <a:ext uri="{FF2B5EF4-FFF2-40B4-BE49-F238E27FC236}">
+                <a16:creationId xmlns:a16="http://schemas.microsoft.com/office/drawing/2014/main" id="{D980840D-34FD-274F-AA95-432E0FC1F485}"/>
+              </a:ext>
+            </a:extLst>
+          </p:cNvPr>
+          <p:cNvPicPr>
+            <a:picLocks noChangeAspect="1"/>
+          </p:cNvPicPr>
+          <p:nvPr/>
+        </p:nvPicPr>
+        <p:blipFill>
+          <a:blip r:embed="rId3"/>
+          <a:stretch>
+            <a:fillRect/>
+          </a:stretch>
+        </p:blipFill>
+        <p:spPr>
+          <a:xfrm>
+            <a:off x="0" y="6016521"/>
+            <a:ext cx="9144000" cy="549189"/>
+          </a:xfrm>
+          <a:prstGeom prst="rect">
+            <a:avLst/>
+          </a:prstGeom>
+        </p:spPr>
+      </p:pic>
     </p:spTree>
     <p:extLst>
       <p:ext uri="{BB962C8B-B14F-4D97-AF65-F5344CB8AC3E}">
@@ -10818,28 +11188,28 @@
       </p:sp>
       <p:pic>
         <p:nvPicPr>
-          <p:cNvPr id="3" name="Picture 2"/>
+          <p:cNvPr id="8" name="Picture 7">
+            <a:extLst>
+              <a:ext uri="{FF2B5EF4-FFF2-40B4-BE49-F238E27FC236}">
+                <a16:creationId xmlns:a16="http://schemas.microsoft.com/office/drawing/2014/main" id="{BDF7B7F8-FB4D-B34D-A5D9-EF09A6707FA5}"/>
+              </a:ext>
+            </a:extLst>
+          </p:cNvPr>
           <p:cNvPicPr>
             <a:picLocks noChangeAspect="1"/>
           </p:cNvPicPr>
           <p:nvPr/>
         </p:nvPicPr>
         <p:blipFill>
-          <a:blip r:embed="rId2">
-            <a:extLst>
-              <a:ext uri="{28A0092B-C50C-407E-A947-70E740481C1C}">
-                <a14:useLocalDpi xmlns:a14="http://schemas.microsoft.com/office/drawing/2010/main" val="0"/>
-              </a:ext>
-            </a:extLst>
-          </a:blip>
+          <a:blip r:embed="rId2"/>
           <a:stretch>
             <a:fillRect/>
           </a:stretch>
         </p:blipFill>
         <p:spPr>
           <a:xfrm>
-            <a:off x="0" y="797391"/>
-            <a:ext cx="9144000" cy="5966642"/>
+            <a:off x="0" y="722235"/>
+            <a:ext cx="9144000" cy="6159916"/>
           </a:xfrm>
           <a:prstGeom prst="rect">
             <a:avLst/>
@@ -10848,14 +11218,16 @@
       </p:pic>
       <p:cxnSp>
         <p:nvCxnSpPr>
-          <p:cNvPr id="6" name="Straight Arrow Connector 5"/>
-          <p:cNvCxnSpPr/>
+          <p:cNvPr id="9" name="Straight Arrow Connector 8"/>
+          <p:cNvCxnSpPr>
+            <a:cxnSpLocks/>
+          </p:cNvCxnSpPr>
           <p:nvPr/>
         </p:nvCxnSpPr>
         <p:spPr>
           <a:xfrm>
-            <a:off x="4346532" y="2555310"/>
-            <a:ext cx="463463" cy="0"/>
+            <a:off x="5254668" y="1550504"/>
+            <a:ext cx="0" cy="464825"/>
           </a:xfrm>
           <a:prstGeom prst="straightConnector1">
             <a:avLst/>
@@ -10882,68 +11254,34 @@
       </p:cxnSp>
       <p:pic>
         <p:nvPicPr>
-          <p:cNvPr id="7" name="Picture 6"/>
+          <p:cNvPr id="10" name="Picture 9">
+            <a:extLst>
+              <a:ext uri="{FF2B5EF4-FFF2-40B4-BE49-F238E27FC236}">
+                <a16:creationId xmlns:a16="http://schemas.microsoft.com/office/drawing/2014/main" id="{280B0BBF-DDBA-CB41-AB8A-D9291867B76B}"/>
+              </a:ext>
+            </a:extLst>
+          </p:cNvPr>
           <p:cNvPicPr>
             <a:picLocks noChangeAspect="1"/>
           </p:cNvPicPr>
           <p:nvPr/>
         </p:nvPicPr>
         <p:blipFill>
-          <a:blip r:embed="rId3">
-            <a:extLst>
-              <a:ext uri="{28A0092B-C50C-407E-A947-70E740481C1C}">
-                <a14:useLocalDpi xmlns:a14="http://schemas.microsoft.com/office/drawing/2010/main" val="0"/>
-              </a:ext>
-            </a:extLst>
-          </a:blip>
+          <a:blip r:embed="rId3"/>
           <a:stretch>
             <a:fillRect/>
           </a:stretch>
         </p:blipFill>
         <p:spPr>
           <a:xfrm>
-            <a:off x="679450" y="4996320"/>
-            <a:ext cx="7785100" cy="1587500"/>
+            <a:off x="0" y="6135765"/>
+            <a:ext cx="9144000" cy="608966"/>
           </a:xfrm>
           <a:prstGeom prst="rect">
             <a:avLst/>
           </a:prstGeom>
         </p:spPr>
       </p:pic>
-      <p:cxnSp>
-        <p:nvCxnSpPr>
-          <p:cNvPr id="9" name="Straight Arrow Connector 8"/>
-          <p:cNvCxnSpPr/>
-          <p:nvPr/>
-        </p:nvCxnSpPr>
-        <p:spPr>
-          <a:xfrm>
-            <a:off x="3883068" y="1653436"/>
-            <a:ext cx="0" cy="501041"/>
-          </a:xfrm>
-          <a:prstGeom prst="straightConnector1">
-            <a:avLst/>
-          </a:prstGeom>
-          <a:ln w="50800">
-            <a:headEnd type="triangle"/>
-            <a:tailEnd type="triangle"/>
-          </a:ln>
-        </p:spPr>
-        <p:style>
-          <a:lnRef idx="2">
-            <a:schemeClr val="accent1"/>
-          </a:lnRef>
-          <a:fillRef idx="0">
-            <a:schemeClr val="accent1"/>
-          </a:fillRef>
-          <a:effectRef idx="1">
-            <a:schemeClr val="accent1"/>
-          </a:effectRef>
-          <a:fontRef idx="minor">
-            <a:schemeClr val="tx1"/>
-          </a:fontRef>
-        </p:style>
-      </p:cxnSp>
     </p:spTree>
     <p:extLst>
       <p:ext uri="{BB962C8B-B14F-4D97-AF65-F5344CB8AC3E}">
@@ -11559,28 +11897,28 @@
       </p:sp>
       <p:pic>
         <p:nvPicPr>
-          <p:cNvPr id="3" name="Picture 2"/>
+          <p:cNvPr id="4" name="Picture 3">
+            <a:extLst>
+              <a:ext uri="{FF2B5EF4-FFF2-40B4-BE49-F238E27FC236}">
+                <a16:creationId xmlns:a16="http://schemas.microsoft.com/office/drawing/2014/main" id="{14C8F900-476C-DB4C-BC29-B84C018430A3}"/>
+              </a:ext>
+            </a:extLst>
+          </p:cNvPr>
           <p:cNvPicPr>
             <a:picLocks noChangeAspect="1"/>
           </p:cNvPicPr>
           <p:nvPr/>
         </p:nvPicPr>
         <p:blipFill>
-          <a:blip r:embed="rId2">
-            <a:extLst>
-              <a:ext uri="{28A0092B-C50C-407E-A947-70E740481C1C}">
-                <a14:useLocalDpi xmlns:a14="http://schemas.microsoft.com/office/drawing/2010/main" val="0"/>
-              </a:ext>
-            </a:extLst>
-          </a:blip>
+          <a:blip r:embed="rId2"/>
           <a:stretch>
             <a:fillRect/>
           </a:stretch>
         </p:blipFill>
         <p:spPr>
           <a:xfrm>
-            <a:off x="0" y="797391"/>
-            <a:ext cx="9144000" cy="5966642"/>
+            <a:off x="0" y="722235"/>
+            <a:ext cx="9144000" cy="6159916"/>
           </a:xfrm>
           <a:prstGeom prst="rect">
             <a:avLst/>
@@ -12520,28 +12858,28 @@
       </p:sp>
       <p:pic>
         <p:nvPicPr>
-          <p:cNvPr id="2" name="Picture 1"/>
+          <p:cNvPr id="4" name="Picture 3">
+            <a:extLst>
+              <a:ext uri="{FF2B5EF4-FFF2-40B4-BE49-F238E27FC236}">
+                <a16:creationId xmlns:a16="http://schemas.microsoft.com/office/drawing/2014/main" id="{F23E8685-D5BC-2B4A-80CE-597ADCF02B8F}"/>
+              </a:ext>
+            </a:extLst>
+          </p:cNvPr>
           <p:cNvPicPr>
             <a:picLocks noChangeAspect="1"/>
           </p:cNvPicPr>
           <p:nvPr/>
         </p:nvPicPr>
         <p:blipFill>
-          <a:blip r:embed="rId2">
-            <a:extLst>
-              <a:ext uri="{28A0092B-C50C-407E-A947-70E740481C1C}">
-                <a14:useLocalDpi xmlns:a14="http://schemas.microsoft.com/office/drawing/2010/main" val="0"/>
-              </a:ext>
-            </a:extLst>
-          </a:blip>
+          <a:blip r:embed="rId2"/>
           <a:stretch>
             <a:fillRect/>
           </a:stretch>
         </p:blipFill>
         <p:spPr>
           <a:xfrm>
-            <a:off x="0" y="797391"/>
-            <a:ext cx="9144000" cy="6216952"/>
+            <a:off x="0" y="722235"/>
+            <a:ext cx="9144000" cy="6288808"/>
           </a:xfrm>
           <a:prstGeom prst="rect">
             <a:avLst/>
@@ -15449,16 +15787,10 @@
               </a:lnSpc>
             </a:pPr>
             <a:r>
-              <a:rPr lang="en-US" sz="1800" dirty="0" err="1">
+              <a:rPr lang="en-US" sz="1800">
                 <a:latin typeface="Courier New" charset="0"/>
               </a:rPr>
-              <a:t>darObjetoA</a:t>
-            </a:r>
-            <a:r>
-              <a:rPr lang="en-US" sz="1800" dirty="0">
-                <a:latin typeface="Courier New" charset="0"/>
-              </a:rPr>
-              <a:t>(</a:t>
+              <a:t>darObjetoEn(</a:t>
             </a:r>
             <a:r>
               <a:rPr lang="en-US" sz="1800" b="0" i="1" dirty="0"/>
@@ -18658,28 +18990,28 @@
       </p:sp>
       <p:pic>
         <p:nvPicPr>
-          <p:cNvPr id="2" name="Picture 1"/>
+          <p:cNvPr id="8" name="Picture 7">
+            <a:extLst>
+              <a:ext uri="{FF2B5EF4-FFF2-40B4-BE49-F238E27FC236}">
+                <a16:creationId xmlns:a16="http://schemas.microsoft.com/office/drawing/2014/main" id="{059D44CD-0F74-2247-B072-22F8E8FDE618}"/>
+              </a:ext>
+            </a:extLst>
+          </p:cNvPr>
           <p:cNvPicPr>
             <a:picLocks noChangeAspect="1"/>
           </p:cNvPicPr>
           <p:nvPr/>
         </p:nvPicPr>
         <p:blipFill>
-          <a:blip r:embed="rId2">
-            <a:extLst>
-              <a:ext uri="{28A0092B-C50C-407E-A947-70E740481C1C}">
-                <a14:useLocalDpi xmlns:a14="http://schemas.microsoft.com/office/drawing/2010/main" val="0"/>
-              </a:ext>
-            </a:extLst>
-          </a:blip>
+          <a:blip r:embed="rId2"/>
           <a:stretch>
             <a:fillRect/>
           </a:stretch>
         </p:blipFill>
         <p:spPr>
           <a:xfrm>
-            <a:off x="0" y="797391"/>
-            <a:ext cx="9144000" cy="5970850"/>
+            <a:off x="0" y="722235"/>
+            <a:ext cx="9144000" cy="6159916"/>
           </a:xfrm>
           <a:prstGeom prst="rect">
             <a:avLst/>

</xml_diff>